<commit_message>
Update UG based on peer review
</commit_message>
<xml_diff>
--- a/docs/images/annotatedUI.pptx
+++ b/docs/images/annotatedUI.pptx
@@ -104,6 +104,11 @@
       </a:defRPr>
     </a:lvl9pPr>
   </p:defaultTextStyle>
+  <p:extLst>
+    <p:ext uri="{EFAFB233-063F-42B5-8137-9DF3F51BA10A}">
+      <p15:sldGuideLst xmlns:p15="http://schemas.microsoft.com/office/powerpoint/2012/main"/>
+    </p:ext>
+  </p:extLst>
 </p:presentation>
 </file>
 
@@ -256,7 +261,7 @@
           <a:p>
             <a:fld id="{3C58AE04-2E89-417B-85EA-8ECFF1A6131F}" type="datetimeFigureOut">
               <a:rPr lang="en-SG" smtClean="0"/>
-              <a:t>28/10/2020</a:t>
+              <a:t>29/10/2020</a:t>
             </a:fld>
             <a:endParaRPr lang="en-SG"/>
           </a:p>
@@ -456,7 +461,7 @@
           <a:p>
             <a:fld id="{3C58AE04-2E89-417B-85EA-8ECFF1A6131F}" type="datetimeFigureOut">
               <a:rPr lang="en-SG" smtClean="0"/>
-              <a:t>28/10/2020</a:t>
+              <a:t>29/10/2020</a:t>
             </a:fld>
             <a:endParaRPr lang="en-SG"/>
           </a:p>
@@ -666,7 +671,7 @@
           <a:p>
             <a:fld id="{3C58AE04-2E89-417B-85EA-8ECFF1A6131F}" type="datetimeFigureOut">
               <a:rPr lang="en-SG" smtClean="0"/>
-              <a:t>28/10/2020</a:t>
+              <a:t>29/10/2020</a:t>
             </a:fld>
             <a:endParaRPr lang="en-SG"/>
           </a:p>
@@ -866,7 +871,7 @@
           <a:p>
             <a:fld id="{3C58AE04-2E89-417B-85EA-8ECFF1A6131F}" type="datetimeFigureOut">
               <a:rPr lang="en-SG" smtClean="0"/>
-              <a:t>28/10/2020</a:t>
+              <a:t>29/10/2020</a:t>
             </a:fld>
             <a:endParaRPr lang="en-SG"/>
           </a:p>
@@ -1142,7 +1147,7 @@
           <a:p>
             <a:fld id="{3C58AE04-2E89-417B-85EA-8ECFF1A6131F}" type="datetimeFigureOut">
               <a:rPr lang="en-SG" smtClean="0"/>
-              <a:t>28/10/2020</a:t>
+              <a:t>29/10/2020</a:t>
             </a:fld>
             <a:endParaRPr lang="en-SG"/>
           </a:p>
@@ -1410,7 +1415,7 @@
           <a:p>
             <a:fld id="{3C58AE04-2E89-417B-85EA-8ECFF1A6131F}" type="datetimeFigureOut">
               <a:rPr lang="en-SG" smtClean="0"/>
-              <a:t>28/10/2020</a:t>
+              <a:t>29/10/2020</a:t>
             </a:fld>
             <a:endParaRPr lang="en-SG"/>
           </a:p>
@@ -1825,7 +1830,7 @@
           <a:p>
             <a:fld id="{3C58AE04-2E89-417B-85EA-8ECFF1A6131F}" type="datetimeFigureOut">
               <a:rPr lang="en-SG" smtClean="0"/>
-              <a:t>28/10/2020</a:t>
+              <a:t>29/10/2020</a:t>
             </a:fld>
             <a:endParaRPr lang="en-SG"/>
           </a:p>
@@ -1967,7 +1972,7 @@
           <a:p>
             <a:fld id="{3C58AE04-2E89-417B-85EA-8ECFF1A6131F}" type="datetimeFigureOut">
               <a:rPr lang="en-SG" smtClean="0"/>
-              <a:t>28/10/2020</a:t>
+              <a:t>29/10/2020</a:t>
             </a:fld>
             <a:endParaRPr lang="en-SG"/>
           </a:p>
@@ -2080,7 +2085,7 @@
           <a:p>
             <a:fld id="{3C58AE04-2E89-417B-85EA-8ECFF1A6131F}" type="datetimeFigureOut">
               <a:rPr lang="en-SG" smtClean="0"/>
-              <a:t>28/10/2020</a:t>
+              <a:t>29/10/2020</a:t>
             </a:fld>
             <a:endParaRPr lang="en-SG"/>
           </a:p>
@@ -2393,7 +2398,7 @@
           <a:p>
             <a:fld id="{3C58AE04-2E89-417B-85EA-8ECFF1A6131F}" type="datetimeFigureOut">
               <a:rPr lang="en-SG" smtClean="0"/>
-              <a:t>28/10/2020</a:t>
+              <a:t>29/10/2020</a:t>
             </a:fld>
             <a:endParaRPr lang="en-SG"/>
           </a:p>
@@ -2682,7 +2687,7 @@
           <a:p>
             <a:fld id="{3C58AE04-2E89-417B-85EA-8ECFF1A6131F}" type="datetimeFigureOut">
               <a:rPr lang="en-SG" smtClean="0"/>
-              <a:t>28/10/2020</a:t>
+              <a:t>29/10/2020</a:t>
             </a:fld>
             <a:endParaRPr lang="en-SG"/>
           </a:p>
@@ -2925,7 +2930,7 @@
           <a:p>
             <a:fld id="{3C58AE04-2E89-417B-85EA-8ECFF1A6131F}" type="datetimeFigureOut">
               <a:rPr lang="en-SG" smtClean="0"/>
-              <a:t>28/10/2020</a:t>
+              <a:t>29/10/2020</a:t>
             </a:fld>
             <a:endParaRPr lang="en-SG"/>
           </a:p>
@@ -3499,7 +3504,7 @@
           <a:noFill/>
           <a:ln w="76200">
             <a:solidFill>
-              <a:srgbClr val="92D050"/>
+              <a:schemeClr val="accent2"/>
             </a:solidFill>
           </a:ln>
         </p:spPr>
@@ -3650,7 +3655,7 @@
           <p:nvPr>
             <p:extLst>
               <p:ext uri="{D42A27DB-BD31-4B8C-83A1-F6EECF244321}">
-                <p14:modId xmlns:p14="http://schemas.microsoft.com/office/powerpoint/2010/main" val="3807135604"/>
+                <p14:modId xmlns:p14="http://schemas.microsoft.com/office/powerpoint/2010/main" val="1021461131"/>
               </p:ext>
             </p:extLst>
           </p:nvPr>
@@ -3770,14 +3775,14 @@
                       <a:r>
                         <a:rPr lang="en-US" dirty="0">
                           <a:solidFill>
-                            <a:srgbClr val="92D050"/>
+                            <a:schemeClr val="accent2"/>
                           </a:solidFill>
                         </a:rPr>
                         <a:t>Command Result</a:t>
                       </a:r>
                       <a:endParaRPr lang="en-SG" dirty="0">
                         <a:solidFill>
-                          <a:srgbClr val="92D050"/>
+                          <a:schemeClr val="accent2"/>
                         </a:solidFill>
                       </a:endParaRPr>
                     </a:p>

</xml_diff>

<commit_message>
Update UG up to first command feature
</commit_message>
<xml_diff>
--- a/docs/images/annotatedUI.pptx
+++ b/docs/images/annotatedUI.pptx
@@ -261,7 +261,7 @@
           <a:p>
             <a:fld id="{3C58AE04-2E89-417B-85EA-8ECFF1A6131F}" type="datetimeFigureOut">
               <a:rPr lang="en-SG" smtClean="0"/>
-              <a:t>29/10/2020</a:t>
+              <a:t>8/11/2020</a:t>
             </a:fld>
             <a:endParaRPr lang="en-SG"/>
           </a:p>
@@ -461,7 +461,7 @@
           <a:p>
             <a:fld id="{3C58AE04-2E89-417B-85EA-8ECFF1A6131F}" type="datetimeFigureOut">
               <a:rPr lang="en-SG" smtClean="0"/>
-              <a:t>29/10/2020</a:t>
+              <a:t>8/11/2020</a:t>
             </a:fld>
             <a:endParaRPr lang="en-SG"/>
           </a:p>
@@ -671,7 +671,7 @@
           <a:p>
             <a:fld id="{3C58AE04-2E89-417B-85EA-8ECFF1A6131F}" type="datetimeFigureOut">
               <a:rPr lang="en-SG" smtClean="0"/>
-              <a:t>29/10/2020</a:t>
+              <a:t>8/11/2020</a:t>
             </a:fld>
             <a:endParaRPr lang="en-SG"/>
           </a:p>
@@ -871,7 +871,7 @@
           <a:p>
             <a:fld id="{3C58AE04-2E89-417B-85EA-8ECFF1A6131F}" type="datetimeFigureOut">
               <a:rPr lang="en-SG" smtClean="0"/>
-              <a:t>29/10/2020</a:t>
+              <a:t>8/11/2020</a:t>
             </a:fld>
             <a:endParaRPr lang="en-SG"/>
           </a:p>
@@ -1147,7 +1147,7 @@
           <a:p>
             <a:fld id="{3C58AE04-2E89-417B-85EA-8ECFF1A6131F}" type="datetimeFigureOut">
               <a:rPr lang="en-SG" smtClean="0"/>
-              <a:t>29/10/2020</a:t>
+              <a:t>8/11/2020</a:t>
             </a:fld>
             <a:endParaRPr lang="en-SG"/>
           </a:p>
@@ -1415,7 +1415,7 @@
           <a:p>
             <a:fld id="{3C58AE04-2E89-417B-85EA-8ECFF1A6131F}" type="datetimeFigureOut">
               <a:rPr lang="en-SG" smtClean="0"/>
-              <a:t>29/10/2020</a:t>
+              <a:t>8/11/2020</a:t>
             </a:fld>
             <a:endParaRPr lang="en-SG"/>
           </a:p>
@@ -1830,7 +1830,7 @@
           <a:p>
             <a:fld id="{3C58AE04-2E89-417B-85EA-8ECFF1A6131F}" type="datetimeFigureOut">
               <a:rPr lang="en-SG" smtClean="0"/>
-              <a:t>29/10/2020</a:t>
+              <a:t>8/11/2020</a:t>
             </a:fld>
             <a:endParaRPr lang="en-SG"/>
           </a:p>
@@ -1972,7 +1972,7 @@
           <a:p>
             <a:fld id="{3C58AE04-2E89-417B-85EA-8ECFF1A6131F}" type="datetimeFigureOut">
               <a:rPr lang="en-SG" smtClean="0"/>
-              <a:t>29/10/2020</a:t>
+              <a:t>8/11/2020</a:t>
             </a:fld>
             <a:endParaRPr lang="en-SG"/>
           </a:p>
@@ -2085,7 +2085,7 @@
           <a:p>
             <a:fld id="{3C58AE04-2E89-417B-85EA-8ECFF1A6131F}" type="datetimeFigureOut">
               <a:rPr lang="en-SG" smtClean="0"/>
-              <a:t>29/10/2020</a:t>
+              <a:t>8/11/2020</a:t>
             </a:fld>
             <a:endParaRPr lang="en-SG"/>
           </a:p>
@@ -2398,7 +2398,7 @@
           <a:p>
             <a:fld id="{3C58AE04-2E89-417B-85EA-8ECFF1A6131F}" type="datetimeFigureOut">
               <a:rPr lang="en-SG" smtClean="0"/>
-              <a:t>29/10/2020</a:t>
+              <a:t>8/11/2020</a:t>
             </a:fld>
             <a:endParaRPr lang="en-SG"/>
           </a:p>
@@ -2687,7 +2687,7 @@
           <a:p>
             <a:fld id="{3C58AE04-2E89-417B-85EA-8ECFF1A6131F}" type="datetimeFigureOut">
               <a:rPr lang="en-SG" smtClean="0"/>
-              <a:t>29/10/2020</a:t>
+              <a:t>8/11/2020</a:t>
             </a:fld>
             <a:endParaRPr lang="en-SG"/>
           </a:p>
@@ -2930,7 +2930,7 @@
           <a:p>
             <a:fld id="{3C58AE04-2E89-417B-85EA-8ECFF1A6131F}" type="datetimeFigureOut">
               <a:rPr lang="en-SG" smtClean="0"/>
-              <a:t>29/10/2020</a:t>
+              <a:t>8/11/2020</a:t>
             </a:fld>
             <a:endParaRPr lang="en-SG"/>
           </a:p>
@@ -3349,10 +3349,10 @@
       </p:grpSpPr>
       <p:pic>
         <p:nvPicPr>
-          <p:cNvPr id="5" name="Picture 4">
-            <a:extLst>
-              <a:ext uri="{FF2B5EF4-FFF2-40B4-BE49-F238E27FC236}">
-                <a16:creationId xmlns:a16="http://schemas.microsoft.com/office/drawing/2014/main" id="{3BEBC6E6-754E-4D46-9820-EF87764448FD}"/>
+          <p:cNvPr id="3" name="Picture 2">
+            <a:extLst>
+              <a:ext uri="{FF2B5EF4-FFF2-40B4-BE49-F238E27FC236}">
+                <a16:creationId xmlns:a16="http://schemas.microsoft.com/office/drawing/2014/main" id="{C34537A6-0197-4CE8-9E53-9100CD8E4125}"/>
               </a:ext>
             </a:extLst>
           </p:cNvPr>
@@ -3362,15 +3362,21 @@
           <p:nvPr/>
         </p:nvPicPr>
         <p:blipFill>
-          <a:blip r:embed="rId2"/>
+          <a:blip r:embed="rId2">
+            <a:extLst>
+              <a:ext uri="{28A0092B-C50C-407E-A947-70E740481C1C}">
+                <a14:useLocalDpi xmlns:a14="http://schemas.microsoft.com/office/drawing/2010/main" val="0"/>
+              </a:ext>
+            </a:extLst>
+          </a:blip>
           <a:stretch>
             <a:fillRect/>
           </a:stretch>
         </p:blipFill>
         <p:spPr>
           <a:xfrm>
-            <a:off x="1246094" y="733425"/>
-            <a:ext cx="9699812" cy="5153025"/>
+            <a:off x="28576" y="0"/>
+            <a:ext cx="12192000" cy="6473235"/>
           </a:xfrm>
           <a:prstGeom prst="rect">
             <a:avLst/>
@@ -3391,8 +3397,8 @@
         </p:nvSpPr>
         <p:spPr>
           <a:xfrm>
-            <a:off x="3067049" y="971550"/>
-            <a:ext cx="914401" cy="285750"/>
+            <a:off x="2371724" y="284753"/>
+            <a:ext cx="1019176" cy="381000"/>
           </a:xfrm>
           <a:prstGeom prst="rect">
             <a:avLst/>
@@ -3443,8 +3449,8 @@
         </p:nvSpPr>
         <p:spPr>
           <a:xfrm>
-            <a:off x="1323974" y="1390650"/>
-            <a:ext cx="9525001" cy="285750"/>
+            <a:off x="95249" y="824230"/>
+            <a:ext cx="12001501" cy="370840"/>
           </a:xfrm>
           <a:prstGeom prst="rect">
             <a:avLst/>
@@ -3495,8 +3501,8 @@
         </p:nvSpPr>
         <p:spPr>
           <a:xfrm>
-            <a:off x="1323974" y="1790699"/>
-            <a:ext cx="9525001" cy="638175"/>
+            <a:off x="95249" y="1281271"/>
+            <a:ext cx="12001501" cy="899954"/>
           </a:xfrm>
           <a:prstGeom prst="rect">
             <a:avLst/>
@@ -3547,8 +3553,8 @@
         </p:nvSpPr>
         <p:spPr>
           <a:xfrm>
-            <a:off x="1466849" y="3119438"/>
-            <a:ext cx="3028951" cy="2347912"/>
+            <a:off x="266699" y="2428875"/>
+            <a:ext cx="3819525" cy="3790949"/>
           </a:xfrm>
           <a:prstGeom prst="rect">
             <a:avLst/>
@@ -3599,8 +3605,8 @@
         </p:nvSpPr>
         <p:spPr>
           <a:xfrm>
-            <a:off x="7715249" y="3109912"/>
-            <a:ext cx="3009902" cy="2347910"/>
+            <a:off x="8134350" y="2424615"/>
+            <a:ext cx="3819524" cy="3790948"/>
           </a:xfrm>
           <a:prstGeom prst="rect">
             <a:avLst/>
@@ -3655,14 +3661,14 @@
           <p:nvPr>
             <p:extLst>
               <p:ext uri="{D42A27DB-BD31-4B8C-83A1-F6EECF244321}">
-                <p14:modId xmlns:p14="http://schemas.microsoft.com/office/powerpoint/2010/main" val="1021461131"/>
+                <p14:modId xmlns:p14="http://schemas.microsoft.com/office/powerpoint/2010/main" val="2552820043"/>
               </p:ext>
             </p:extLst>
           </p:nvPr>
         </p:nvGraphicFramePr>
         <p:xfrm>
-          <a:off x="1246093" y="5891530"/>
-          <a:ext cx="9699810" cy="370840"/>
+          <a:off x="28576" y="6464028"/>
+          <a:ext cx="12163424" cy="370840"/>
         </p:xfrm>
         <a:graphic>
           <a:graphicData uri="http://schemas.openxmlformats.org/drawingml/2006/table">
@@ -3671,42 +3677,42 @@
                 <a:tableStyleId>{5940675A-B579-460E-94D1-54222C63F5DA}</a:tableStyleId>
               </a:tblPr>
               <a:tblGrid>
-                <a:gridCol w="1173257">
+                <a:gridCol w="1471248">
                   <a:extLst>
                     <a:ext uri="{9D8B030D-6E8A-4147-A177-3AD203B41FA5}">
                       <a16:colId xmlns:a16="http://schemas.microsoft.com/office/drawing/2014/main" val="262608642"/>
                     </a:ext>
                   </a:extLst>
                 </a:gridCol>
-                <a:gridCol w="1638300">
+                <a:gridCol w="2054405">
                   <a:extLst>
                     <a:ext uri="{9D8B030D-6E8A-4147-A177-3AD203B41FA5}">
                       <a16:colId xmlns:a16="http://schemas.microsoft.com/office/drawing/2014/main" val="314479685"/>
                     </a:ext>
                   </a:extLst>
                 </a:gridCol>
-                <a:gridCol w="1914525">
+                <a:gridCol w="2400787">
                   <a:extLst>
                     <a:ext uri="{9D8B030D-6E8A-4147-A177-3AD203B41FA5}">
                       <a16:colId xmlns:a16="http://schemas.microsoft.com/office/drawing/2014/main" val="1114171657"/>
                     </a:ext>
                   </a:extLst>
                 </a:gridCol>
-                <a:gridCol w="1533525">
+                <a:gridCol w="1923018">
                   <a:extLst>
                     <a:ext uri="{9D8B030D-6E8A-4147-A177-3AD203B41FA5}">
                       <a16:colId xmlns:a16="http://schemas.microsoft.com/office/drawing/2014/main" val="884494354"/>
                     </a:ext>
                   </a:extLst>
                 </a:gridCol>
-                <a:gridCol w="1695450">
+                <a:gridCol w="2126070">
                   <a:extLst>
                     <a:ext uri="{9D8B030D-6E8A-4147-A177-3AD203B41FA5}">
                       <a16:colId xmlns:a16="http://schemas.microsoft.com/office/drawing/2014/main" val="3214748203"/>
                     </a:ext>
                   </a:extLst>
                 </a:gridCol>
-                <a:gridCol w="1744753">
+                <a:gridCol w="2187896">
                   <a:extLst>
                     <a:ext uri="{9D8B030D-6E8A-4147-A177-3AD203B41FA5}">
                       <a16:colId xmlns:a16="http://schemas.microsoft.com/office/drawing/2014/main" val="1840967698"/>
@@ -3901,8 +3907,8 @@
         </p:nvSpPr>
         <p:spPr>
           <a:xfrm>
-            <a:off x="4619625" y="3109912"/>
-            <a:ext cx="3009902" cy="2357438"/>
+            <a:off x="4229100" y="2428875"/>
+            <a:ext cx="3819525" cy="3790949"/>
           </a:xfrm>
           <a:prstGeom prst="rect">
             <a:avLst/>

</xml_diff>